<commit_message>
velocity time statistics and plots done
</commit_message>
<xml_diff>
--- a/figures/Final_curves/all_curves_figure.pptx
+++ b/figures/Final_curves/all_curves_figure.pptx
@@ -3041,15 +3041,15 @@
               </p:nvGrpSpPr>
               <p:grpSpPr>
                 <a:xfrm>
-                  <a:off x="1616305" y="1779371"/>
-                  <a:ext cx="8912555" cy="2868141"/>
-                  <a:chOff x="1616305" y="1779371"/>
-                  <a:chExt cx="8912555" cy="2868141"/>
+                  <a:off x="1616305" y="1775353"/>
+                  <a:ext cx="8912555" cy="2872159"/>
+                  <a:chOff x="1616305" y="1775353"/>
+                  <a:chExt cx="8912555" cy="2872159"/>
                 </a:xfrm>
               </p:grpSpPr>
               <p:pic>
                 <p:nvPicPr>
-                  <p:cNvPr id="10" name="Picture 9" descr="A close up of a logo&#10;&#10;Description automatically generated">
+                  <p:cNvPr id="10" name="Picture 9">
                     <a:extLst>
                       <a:ext uri="{FF2B5EF4-FFF2-40B4-BE49-F238E27FC236}">
                         <a16:creationId xmlns:a16="http://schemas.microsoft.com/office/drawing/2014/main" id="{F7149EA5-1C86-3643-9015-C110D259346B}"/>
@@ -3063,14 +3063,13 @@
                 </p:nvPicPr>
                 <p:blipFill>
                   <a:blip r:embed="rId2"/>
-                  <a:stretch>
-                    <a:fillRect/>
-                  </a:stretch>
+                  <a:srcRect/>
+                  <a:stretch/>
                 </p:blipFill>
                 <p:spPr>
                   <a:xfrm>
-                    <a:off x="1616305" y="1779371"/>
-                    <a:ext cx="4479695" cy="2868141"/>
+                    <a:off x="1616305" y="1775353"/>
+                    <a:ext cx="4479695" cy="2855386"/>
                   </a:xfrm>
                   <a:prstGeom prst="rect">
                     <a:avLst/>
@@ -3246,9 +3245,9 @@
           <p:grpSpPr>
             <a:xfrm>
               <a:off x="391896" y="2854236"/>
-              <a:ext cx="6621829" cy="2361198"/>
+              <a:ext cx="6621829" cy="2378127"/>
               <a:chOff x="1616305" y="1754673"/>
-              <a:chExt cx="8926806" cy="2892839"/>
+              <a:chExt cx="8926806" cy="2913579"/>
             </a:xfrm>
           </p:grpSpPr>
           <p:grpSp>
@@ -3266,9 +3265,9 @@
             <p:grpSpPr>
               <a:xfrm>
                 <a:off x="1616305" y="1754673"/>
-                <a:ext cx="8926806" cy="2892839"/>
+                <a:ext cx="8926806" cy="2913579"/>
                 <a:chOff x="1616305" y="1754673"/>
-                <a:chExt cx="8926806" cy="2892839"/>
+                <a:chExt cx="8926806" cy="2913579"/>
               </a:xfrm>
             </p:grpSpPr>
             <p:grpSp>
@@ -3286,9 +3285,9 @@
               <p:grpSpPr>
                 <a:xfrm>
                   <a:off x="1616305" y="1754673"/>
-                  <a:ext cx="8851152" cy="2892839"/>
+                  <a:ext cx="8851152" cy="2913579"/>
                   <a:chOff x="1616305" y="1754673"/>
-                  <a:chExt cx="8851152" cy="2892839"/>
+                  <a:chExt cx="8851152" cy="2913579"/>
                 </a:xfrm>
               </p:grpSpPr>
               <p:grpSp>
@@ -3305,10 +3304,10 @@
                 </p:nvGrpSpPr>
                 <p:grpSpPr>
                   <a:xfrm>
-                    <a:off x="1616305" y="1779371"/>
-                    <a:ext cx="8851152" cy="2868141"/>
-                    <a:chOff x="1616305" y="1779371"/>
-                    <a:chExt cx="8851152" cy="2868141"/>
+                    <a:off x="1616305" y="1754673"/>
+                    <a:ext cx="8851152" cy="2913579"/>
+                    <a:chOff x="1616305" y="1754673"/>
+                    <a:chExt cx="8851152" cy="2913579"/>
                   </a:xfrm>
                 </p:grpSpPr>
                 <p:pic>
@@ -3332,8 +3331,8 @@
                   </p:blipFill>
                   <p:spPr>
                     <a:xfrm>
-                      <a:off x="1616305" y="1779371"/>
-                      <a:ext cx="4479695" cy="2868140"/>
+                      <a:off x="1616305" y="1754673"/>
+                      <a:ext cx="4479695" cy="2913579"/>
                     </a:xfrm>
                     <a:prstGeom prst="rect">
                       <a:avLst/>
@@ -3369,8 +3368,8 @@
                   </p:blipFill>
                   <p:spPr>
                     <a:xfrm>
-                      <a:off x="5968003" y="1779373"/>
-                      <a:ext cx="4499454" cy="2868139"/>
+                      <a:off x="5968003" y="1759701"/>
+                      <a:ext cx="4499454" cy="2898184"/>
                     </a:xfrm>
                     <a:prstGeom prst="rect">
                       <a:avLst/>
@@ -4122,7 +4121,7 @@
                 </p:nvSpPr>
                 <p:spPr>
                   <a:xfrm>
-                    <a:off x="7697909" y="3092612"/>
+                    <a:off x="7518839" y="3070527"/>
                     <a:ext cx="1816656" cy="358261"/>
                   </a:xfrm>
                   <a:prstGeom prst="rect">
@@ -4158,7 +4157,7 @@
               </p:nvSpPr>
               <p:spPr>
                 <a:xfrm>
-                  <a:off x="7697909" y="3314140"/>
+                  <a:off x="7528830" y="3369012"/>
                   <a:ext cx="843345" cy="358261"/>
                 </a:xfrm>
                 <a:prstGeom prst="rect">

</xml_diff>

<commit_message>
fixed bugs in depth scripts, velocity base scripts done
</commit_message>
<xml_diff>
--- a/figures/Final_curves/all_curves_figure.pptx
+++ b/figures/Final_curves/all_curves_figure.pptx
@@ -7,6 +7,8 @@
   <p:sldIdLst>
     <p:sldId id="256" r:id="rId2"/>
     <p:sldId id="257" r:id="rId3"/>
+    <p:sldId id="258" r:id="rId4"/>
+    <p:sldId id="259" r:id="rId5"/>
   </p:sldIdLst>
   <p:sldSz cx="7315200" cy="9321800"/>
   <p:notesSz cx="6858000" cy="9144000"/>
@@ -105,6 +107,27 @@
       </a:defRPr>
     </a:lvl9pPr>
   </p:defaultTextStyle>
+  <p:extLst>
+    <p:ext uri="{521415D9-36F7-43E2-AB2F-B90AF26B5E84}">
+      <p14:sectionLst xmlns:p14="http://schemas.microsoft.com/office/powerpoint/2010/main">
+        <p14:section name="Default Section" id="{A8036439-5CEF-9F48-A427-6B59B16E60DA}">
+          <p14:sldIdLst>
+            <p14:sldId id="256"/>
+            <p14:sldId id="257"/>
+            <p14:sldId id="258"/>
+          </p14:sldIdLst>
+        </p14:section>
+        <p14:section name="Landscape" id="{E1F1543A-352F-EE47-ABF5-DD9A9736114B}">
+          <p14:sldIdLst>
+            <p14:sldId id="259"/>
+          </p14:sldIdLst>
+        </p14:section>
+      </p14:sectionLst>
+    </p:ext>
+    <p:ext uri="{EFAFB233-063F-42B5-8137-9DF3F51BA10A}">
+      <p15:sldGuideLst xmlns:p15="http://schemas.microsoft.com/office/powerpoint/2012/main"/>
+    </p:ext>
+  </p:extLst>
 </p:presentation>
 </file>
 
@@ -239,7 +262,7 @@
           <a:p>
             <a:fld id="{6AFB6AB3-139C-BF4B-9B80-F7671646498D}" type="datetimeFigureOut">
               <a:rPr lang="en-US" smtClean="0"/>
-              <a:t>7/27/20</a:t>
+              <a:t>9/16/20</a:t>
             </a:fld>
             <a:endParaRPr lang="en-US"/>
           </a:p>
@@ -409,7 +432,7 @@
           <a:p>
             <a:fld id="{6AFB6AB3-139C-BF4B-9B80-F7671646498D}" type="datetimeFigureOut">
               <a:rPr lang="en-US" smtClean="0"/>
-              <a:t>7/27/20</a:t>
+              <a:t>9/16/20</a:t>
             </a:fld>
             <a:endParaRPr lang="en-US"/>
           </a:p>
@@ -589,7 +612,7 @@
           <a:p>
             <a:fld id="{6AFB6AB3-139C-BF4B-9B80-F7671646498D}" type="datetimeFigureOut">
               <a:rPr lang="en-US" smtClean="0"/>
-              <a:t>7/27/20</a:t>
+              <a:t>9/16/20</a:t>
             </a:fld>
             <a:endParaRPr lang="en-US"/>
           </a:p>
@@ -759,7 +782,7 @@
           <a:p>
             <a:fld id="{6AFB6AB3-139C-BF4B-9B80-F7671646498D}" type="datetimeFigureOut">
               <a:rPr lang="en-US" smtClean="0"/>
-              <a:t>7/27/20</a:t>
+              <a:t>9/16/20</a:t>
             </a:fld>
             <a:endParaRPr lang="en-US"/>
           </a:p>
@@ -1003,7 +1026,7 @@
           <a:p>
             <a:fld id="{6AFB6AB3-139C-BF4B-9B80-F7671646498D}" type="datetimeFigureOut">
               <a:rPr lang="en-US" smtClean="0"/>
-              <a:t>7/27/20</a:t>
+              <a:t>9/16/20</a:t>
             </a:fld>
             <a:endParaRPr lang="en-US"/>
           </a:p>
@@ -1235,7 +1258,7 @@
           <a:p>
             <a:fld id="{6AFB6AB3-139C-BF4B-9B80-F7671646498D}" type="datetimeFigureOut">
               <a:rPr lang="en-US" smtClean="0"/>
-              <a:t>7/27/20</a:t>
+              <a:t>9/16/20</a:t>
             </a:fld>
             <a:endParaRPr lang="en-US"/>
           </a:p>
@@ -1602,7 +1625,7 @@
           <a:p>
             <a:fld id="{6AFB6AB3-139C-BF4B-9B80-F7671646498D}" type="datetimeFigureOut">
               <a:rPr lang="en-US" smtClean="0"/>
-              <a:t>7/27/20</a:t>
+              <a:t>9/16/20</a:t>
             </a:fld>
             <a:endParaRPr lang="en-US"/>
           </a:p>
@@ -1720,7 +1743,7 @@
           <a:p>
             <a:fld id="{6AFB6AB3-139C-BF4B-9B80-F7671646498D}" type="datetimeFigureOut">
               <a:rPr lang="en-US" smtClean="0"/>
-              <a:t>7/27/20</a:t>
+              <a:t>9/16/20</a:t>
             </a:fld>
             <a:endParaRPr lang="en-US"/>
           </a:p>
@@ -1815,7 +1838,7 @@
           <a:p>
             <a:fld id="{6AFB6AB3-139C-BF4B-9B80-F7671646498D}" type="datetimeFigureOut">
               <a:rPr lang="en-US" smtClean="0"/>
-              <a:t>7/27/20</a:t>
+              <a:t>9/16/20</a:t>
             </a:fld>
             <a:endParaRPr lang="en-US"/>
           </a:p>
@@ -2092,7 +2115,7 @@
           <a:p>
             <a:fld id="{6AFB6AB3-139C-BF4B-9B80-F7671646498D}" type="datetimeFigureOut">
               <a:rPr lang="en-US" smtClean="0"/>
-              <a:t>7/27/20</a:t>
+              <a:t>9/16/20</a:t>
             </a:fld>
             <a:endParaRPr lang="en-US"/>
           </a:p>
@@ -2349,7 +2372,7 @@
           <a:p>
             <a:fld id="{6AFB6AB3-139C-BF4B-9B80-F7671646498D}" type="datetimeFigureOut">
               <a:rPr lang="en-US" smtClean="0"/>
-              <a:t>7/27/20</a:t>
+              <a:t>9/16/20</a:t>
             </a:fld>
             <a:endParaRPr lang="en-US"/>
           </a:p>
@@ -2562,7 +2585,7 @@
           <a:p>
             <a:fld id="{6AFB6AB3-139C-BF4B-9B80-F7671646498D}" type="datetimeFigureOut">
               <a:rPr lang="en-US" smtClean="0"/>
-              <a:t>7/27/20</a:t>
+              <a:t>9/16/20</a:t>
             </a:fld>
             <a:endParaRPr lang="en-US"/>
           </a:p>
@@ -4953,6 +4976,356 @@
 </p:sld>
 </file>
 
+<file path=ppt/slides/slide3.xml><?xml version="1.0" encoding="utf-8"?>
+<p:sld xmlns:a="http://schemas.openxmlformats.org/drawingml/2006/main" xmlns:r="http://schemas.openxmlformats.org/officeDocument/2006/relationships" xmlns:p="http://schemas.openxmlformats.org/presentationml/2006/main">
+  <p:cSld>
+    <p:spTree>
+      <p:nvGrpSpPr>
+        <p:cNvPr id="1" name=""/>
+        <p:cNvGrpSpPr/>
+        <p:nvPr/>
+      </p:nvGrpSpPr>
+      <p:grpSpPr>
+        <a:xfrm>
+          <a:off x="0" y="0"/>
+          <a:ext cx="0" cy="0"/>
+          <a:chOff x="0" y="0"/>
+          <a:chExt cx="0" cy="0"/>
+        </a:xfrm>
+      </p:grpSpPr>
+      <p:pic>
+        <p:nvPicPr>
+          <p:cNvPr id="5" name="Picture 4">
+            <a:extLst>
+              <a:ext uri="{FF2B5EF4-FFF2-40B4-BE49-F238E27FC236}">
+                <a16:creationId xmlns:a16="http://schemas.microsoft.com/office/drawing/2014/main" id="{891B5415-BED5-C743-A6BB-0BCD87EC10A6}"/>
+              </a:ext>
+            </a:extLst>
+          </p:cNvPr>
+          <p:cNvPicPr>
+            <a:picLocks noChangeAspect="1"/>
+          </p:cNvPicPr>
+          <p:nvPr/>
+        </p:nvPicPr>
+        <p:blipFill>
+          <a:blip r:embed="rId2"/>
+          <a:srcRect/>
+          <a:stretch/>
+        </p:blipFill>
+        <p:spPr>
+          <a:xfrm>
+            <a:off x="629525" y="1187356"/>
+            <a:ext cx="3196020" cy="2282872"/>
+          </a:xfrm>
+          <a:prstGeom prst="rect">
+            <a:avLst/>
+          </a:prstGeom>
+        </p:spPr>
+      </p:pic>
+      <p:pic>
+        <p:nvPicPr>
+          <p:cNvPr id="11" name="Picture 10" descr="A close up of a map&#10;&#10;Description automatically generated">
+            <a:extLst>
+              <a:ext uri="{FF2B5EF4-FFF2-40B4-BE49-F238E27FC236}">
+                <a16:creationId xmlns:a16="http://schemas.microsoft.com/office/drawing/2014/main" id="{BCC926E9-7315-8246-9DD8-E1695744DE0F}"/>
+              </a:ext>
+            </a:extLst>
+          </p:cNvPr>
+          <p:cNvPicPr>
+            <a:picLocks noChangeAspect="1"/>
+          </p:cNvPicPr>
+          <p:nvPr/>
+        </p:nvPicPr>
+        <p:blipFill>
+          <a:blip r:embed="rId3"/>
+          <a:stretch>
+            <a:fillRect/>
+          </a:stretch>
+        </p:blipFill>
+        <p:spPr>
+          <a:xfrm>
+            <a:off x="3762552" y="1257212"/>
+            <a:ext cx="3098222" cy="2213016"/>
+          </a:xfrm>
+          <a:prstGeom prst="rect">
+            <a:avLst/>
+          </a:prstGeom>
+        </p:spPr>
+      </p:pic>
+      <p:pic>
+        <p:nvPicPr>
+          <p:cNvPr id="13" name="Picture 12" descr="A close up of a map&#10;&#10;Description automatically generated">
+            <a:extLst>
+              <a:ext uri="{FF2B5EF4-FFF2-40B4-BE49-F238E27FC236}">
+                <a16:creationId xmlns:a16="http://schemas.microsoft.com/office/drawing/2014/main" id="{3D3F255A-62FB-734A-922C-E6B3BA701604}"/>
+              </a:ext>
+            </a:extLst>
+          </p:cNvPr>
+          <p:cNvPicPr>
+            <a:picLocks noChangeAspect="1"/>
+          </p:cNvPicPr>
+          <p:nvPr/>
+        </p:nvPicPr>
+        <p:blipFill>
+          <a:blip r:embed="rId4"/>
+          <a:stretch>
+            <a:fillRect/>
+          </a:stretch>
+        </p:blipFill>
+        <p:spPr>
+          <a:xfrm>
+            <a:off x="594719" y="3403600"/>
+            <a:ext cx="3393036" cy="2423597"/>
+          </a:xfrm>
+          <a:prstGeom prst="rect">
+            <a:avLst/>
+          </a:prstGeom>
+        </p:spPr>
+      </p:pic>
+      <p:pic>
+        <p:nvPicPr>
+          <p:cNvPr id="15" name="Picture 14" descr="A picture containing map&#10;&#10;Description automatically generated">
+            <a:extLst>
+              <a:ext uri="{FF2B5EF4-FFF2-40B4-BE49-F238E27FC236}">
+                <a16:creationId xmlns:a16="http://schemas.microsoft.com/office/drawing/2014/main" id="{C49D4406-DC05-3E49-B02C-AE04ED01B6D0}"/>
+              </a:ext>
+            </a:extLst>
+          </p:cNvPr>
+          <p:cNvPicPr>
+            <a:picLocks noChangeAspect="1"/>
+          </p:cNvPicPr>
+          <p:nvPr/>
+        </p:nvPicPr>
+        <p:blipFill>
+          <a:blip r:embed="rId5"/>
+          <a:stretch>
+            <a:fillRect/>
+          </a:stretch>
+        </p:blipFill>
+        <p:spPr>
+          <a:xfrm>
+            <a:off x="3860352" y="3403600"/>
+            <a:ext cx="3393036" cy="2423597"/>
+          </a:xfrm>
+          <a:prstGeom prst="rect">
+            <a:avLst/>
+          </a:prstGeom>
+        </p:spPr>
+      </p:pic>
+    </p:spTree>
+    <p:extLst>
+      <p:ext uri="{BB962C8B-B14F-4D97-AF65-F5344CB8AC3E}">
+        <p14:creationId xmlns:p14="http://schemas.microsoft.com/office/powerpoint/2010/main" val="3251767534"/>
+      </p:ext>
+    </p:extLst>
+  </p:cSld>
+  <p:clrMapOvr>
+    <a:masterClrMapping/>
+  </p:clrMapOvr>
+</p:sld>
+</file>
+
+<file path=ppt/slides/slide4.xml><?xml version="1.0" encoding="utf-8"?>
+<p:sld xmlns:a="http://schemas.openxmlformats.org/drawingml/2006/main" xmlns:r="http://schemas.openxmlformats.org/officeDocument/2006/relationships" xmlns:p="http://schemas.openxmlformats.org/presentationml/2006/main">
+  <p:cSld>
+    <p:spTree>
+      <p:nvGrpSpPr>
+        <p:cNvPr id="1" name=""/>
+        <p:cNvGrpSpPr/>
+        <p:nvPr/>
+      </p:nvGrpSpPr>
+      <p:grpSpPr>
+        <a:xfrm>
+          <a:off x="0" y="0"/>
+          <a:ext cx="0" cy="0"/>
+          <a:chOff x="0" y="0"/>
+          <a:chExt cx="0" cy="0"/>
+        </a:xfrm>
+      </p:grpSpPr>
+      <p:grpSp>
+        <p:nvGrpSpPr>
+          <p:cNvPr id="18" name="Group 17">
+            <a:extLst>
+              <a:ext uri="{FF2B5EF4-FFF2-40B4-BE49-F238E27FC236}">
+                <a16:creationId xmlns:a16="http://schemas.microsoft.com/office/drawing/2014/main" id="{A9B396E0-EEC5-0641-85B1-AD9ABDA4A707}"/>
+              </a:ext>
+            </a:extLst>
+          </p:cNvPr>
+          <p:cNvGrpSpPr/>
+          <p:nvPr/>
+        </p:nvGrpSpPr>
+        <p:grpSpPr>
+          <a:xfrm>
+            <a:off x="328115" y="666464"/>
+            <a:ext cx="6987085" cy="4831309"/>
+            <a:chOff x="328115" y="666464"/>
+            <a:chExt cx="6987085" cy="4831309"/>
+          </a:xfrm>
+        </p:grpSpPr>
+        <p:pic>
+          <p:nvPicPr>
+            <p:cNvPr id="3" name="Picture 2" descr="A screenshot of a cell phone&#10;&#10;Description automatically generated">
+              <a:extLst>
+                <a:ext uri="{FF2B5EF4-FFF2-40B4-BE49-F238E27FC236}">
+                  <a16:creationId xmlns:a16="http://schemas.microsoft.com/office/drawing/2014/main" id="{BEAD7F3A-1596-B440-94AA-B8C2026F8E2C}"/>
+                </a:ext>
+              </a:extLst>
+            </p:cNvPr>
+            <p:cNvPicPr>
+              <a:picLocks noChangeAspect="1"/>
+            </p:cNvPicPr>
+            <p:nvPr/>
+          </p:nvPicPr>
+          <p:blipFill>
+            <a:blip r:embed="rId2"/>
+            <a:stretch>
+              <a:fillRect/>
+            </a:stretch>
+          </p:blipFill>
+          <p:spPr>
+            <a:xfrm>
+              <a:off x="2675530" y="3150358"/>
+              <a:ext cx="2347415" cy="2347415"/>
+            </a:xfrm>
+            <a:prstGeom prst="rect">
+              <a:avLst/>
+            </a:prstGeom>
+          </p:spPr>
+        </p:pic>
+        <p:pic>
+          <p:nvPicPr>
+            <p:cNvPr id="6" name="Picture 5" descr="A close up of a map&#10;&#10;Description automatically generated">
+              <a:extLst>
+                <a:ext uri="{FF2B5EF4-FFF2-40B4-BE49-F238E27FC236}">
+                  <a16:creationId xmlns:a16="http://schemas.microsoft.com/office/drawing/2014/main" id="{31965C74-4E8A-4B48-9475-1EDD30C2F589}"/>
+                </a:ext>
+              </a:extLst>
+            </p:cNvPr>
+            <p:cNvPicPr>
+              <a:picLocks noChangeAspect="1"/>
+            </p:cNvPicPr>
+            <p:nvPr/>
+          </p:nvPicPr>
+          <p:blipFill>
+            <a:blip r:embed="rId3"/>
+            <a:stretch>
+              <a:fillRect/>
+            </a:stretch>
+          </p:blipFill>
+          <p:spPr>
+            <a:xfrm>
+              <a:off x="328115" y="3150358"/>
+              <a:ext cx="2347415" cy="2347415"/>
+            </a:xfrm>
+            <a:prstGeom prst="rect">
+              <a:avLst/>
+            </a:prstGeom>
+          </p:spPr>
+        </p:pic>
+        <p:pic>
+          <p:nvPicPr>
+            <p:cNvPr id="8" name="Picture 7" descr="A close up of a map&#10;&#10;Description automatically generated">
+              <a:extLst>
+                <a:ext uri="{FF2B5EF4-FFF2-40B4-BE49-F238E27FC236}">
+                  <a16:creationId xmlns:a16="http://schemas.microsoft.com/office/drawing/2014/main" id="{57C026D3-5316-C24B-AAC4-B440ADD1D7FC}"/>
+                </a:ext>
+              </a:extLst>
+            </p:cNvPr>
+            <p:cNvPicPr>
+              <a:picLocks noChangeAspect="1"/>
+            </p:cNvPicPr>
+            <p:nvPr/>
+          </p:nvPicPr>
+          <p:blipFill>
+            <a:blip r:embed="rId4"/>
+            <a:stretch>
+              <a:fillRect/>
+            </a:stretch>
+          </p:blipFill>
+          <p:spPr>
+            <a:xfrm>
+              <a:off x="328115" y="666464"/>
+              <a:ext cx="2347415" cy="2347415"/>
+            </a:xfrm>
+            <a:prstGeom prst="rect">
+              <a:avLst/>
+            </a:prstGeom>
+          </p:spPr>
+        </p:pic>
+        <p:pic>
+          <p:nvPicPr>
+            <p:cNvPr id="14" name="Picture 13" descr="A close up of a map&#10;&#10;Description automatically generated">
+              <a:extLst>
+                <a:ext uri="{FF2B5EF4-FFF2-40B4-BE49-F238E27FC236}">
+                  <a16:creationId xmlns:a16="http://schemas.microsoft.com/office/drawing/2014/main" id="{55325709-9DD3-CB44-8BA1-17E0466D6A62}"/>
+                </a:ext>
+              </a:extLst>
+            </p:cNvPr>
+            <p:cNvPicPr>
+              <a:picLocks noChangeAspect="1"/>
+            </p:cNvPicPr>
+            <p:nvPr/>
+          </p:nvPicPr>
+          <p:blipFill>
+            <a:blip r:embed="rId5"/>
+            <a:stretch>
+              <a:fillRect/>
+            </a:stretch>
+          </p:blipFill>
+          <p:spPr>
+            <a:xfrm>
+              <a:off x="2675530" y="666464"/>
+              <a:ext cx="2347415" cy="2347415"/>
+            </a:xfrm>
+            <a:prstGeom prst="rect">
+              <a:avLst/>
+            </a:prstGeom>
+          </p:spPr>
+        </p:pic>
+        <p:pic>
+          <p:nvPicPr>
+            <p:cNvPr id="17" name="Picture 16" descr="A close up of a map&#10;&#10;Description automatically generated">
+              <a:extLst>
+                <a:ext uri="{FF2B5EF4-FFF2-40B4-BE49-F238E27FC236}">
+                  <a16:creationId xmlns:a16="http://schemas.microsoft.com/office/drawing/2014/main" id="{09D45BB7-5258-2545-81FA-E73250B5A3E3}"/>
+                </a:ext>
+              </a:extLst>
+            </p:cNvPr>
+            <p:cNvPicPr>
+              <a:picLocks noChangeAspect="1"/>
+            </p:cNvPicPr>
+            <p:nvPr/>
+          </p:nvPicPr>
+          <p:blipFill>
+            <a:blip r:embed="rId6"/>
+            <a:stretch>
+              <a:fillRect/>
+            </a:stretch>
+          </p:blipFill>
+          <p:spPr>
+            <a:xfrm>
+              <a:off x="4967785" y="666464"/>
+              <a:ext cx="2347415" cy="2347415"/>
+            </a:xfrm>
+            <a:prstGeom prst="rect">
+              <a:avLst/>
+            </a:prstGeom>
+          </p:spPr>
+        </p:pic>
+      </p:grpSp>
+    </p:spTree>
+    <p:extLst>
+      <p:ext uri="{BB962C8B-B14F-4D97-AF65-F5344CB8AC3E}">
+        <p14:creationId xmlns:p14="http://schemas.microsoft.com/office/powerpoint/2010/main" val="10830110"/>
+      </p:ext>
+    </p:extLst>
+  </p:cSld>
+  <p:clrMapOvr>
+    <a:masterClrMapping/>
+  </p:clrMapOvr>
+</p:sld>
+</file>
+
 <file path=ppt/theme/theme1.xml><?xml version="1.0" encoding="utf-8"?>
 <a:theme xmlns:a="http://schemas.openxmlformats.org/drawingml/2006/main" name="Office Theme">
   <a:themeElements>

</xml_diff>